<commit_message>
Added threat intel scripts and slide
</commit_message>
<xml_diff>
--- a/B-Sides Knoxville 2015 deck.pptx
+++ b/B-Sides Knoxville 2015 deck.pptx
@@ -5,7 +5,7 @@
     <p:sldMasterId id="2147483648" r:id="rId1"/>
   </p:sldMasterIdLst>
   <p:notesMasterIdLst>
-    <p:notesMasterId r:id="rId42"/>
+    <p:notesMasterId r:id="rId43"/>
   </p:notesMasterIdLst>
   <p:sldIdLst>
     <p:sldId id="256" r:id="rId2"/>
@@ -47,7 +47,8 @@
     <p:sldId id="292" r:id="rId38"/>
     <p:sldId id="293" r:id="rId39"/>
     <p:sldId id="294" r:id="rId40"/>
-    <p:sldId id="295" r:id="rId41"/>
+    <p:sldId id="296" r:id="rId41"/>
+    <p:sldId id="295" r:id="rId42"/>
   </p:sldIdLst>
   <p:sldSz cx="12192000" cy="6858000"/>
   <p:notesSz cx="6858000" cy="9144000"/>
@@ -236,7 +237,7 @@
           <a:p>
             <a:fld id="{B9F96C23-A8F9-4B5E-B1BC-C72C0A9D0711}" type="datetimeFigureOut">
               <a:rPr lang="en-US" smtClean="0"/>
-              <a:t>4/14/2015</a:t>
+              <a:t>5/7/2015</a:t>
             </a:fld>
             <a:endParaRPr lang="en-US"/>
           </a:p>
@@ -1611,7 +1612,7 @@
           <a:p>
             <a:fld id="{A58DD9CA-110A-4A6C-B3D0-ADE9A0792E12}" type="datetimeFigureOut">
               <a:rPr lang="en-US" smtClean="0"/>
-              <a:t>4/14/2015</a:t>
+              <a:t>5/7/2015</a:t>
             </a:fld>
             <a:endParaRPr lang="en-US"/>
           </a:p>
@@ -1781,7 +1782,7 @@
           <a:p>
             <a:fld id="{A58DD9CA-110A-4A6C-B3D0-ADE9A0792E12}" type="datetimeFigureOut">
               <a:rPr lang="en-US" smtClean="0"/>
-              <a:t>4/14/2015</a:t>
+              <a:t>5/7/2015</a:t>
             </a:fld>
             <a:endParaRPr lang="en-US"/>
           </a:p>
@@ -1961,7 +1962,7 @@
           <a:p>
             <a:fld id="{A58DD9CA-110A-4A6C-B3D0-ADE9A0792E12}" type="datetimeFigureOut">
               <a:rPr lang="en-US" smtClean="0"/>
-              <a:t>4/14/2015</a:t>
+              <a:t>5/7/2015</a:t>
             </a:fld>
             <a:endParaRPr lang="en-US"/>
           </a:p>
@@ -2131,7 +2132,7 @@
           <a:p>
             <a:fld id="{A58DD9CA-110A-4A6C-B3D0-ADE9A0792E12}" type="datetimeFigureOut">
               <a:rPr lang="en-US" smtClean="0"/>
-              <a:t>4/14/2015</a:t>
+              <a:t>5/7/2015</a:t>
             </a:fld>
             <a:endParaRPr lang="en-US"/>
           </a:p>
@@ -2377,7 +2378,7 @@
           <a:p>
             <a:fld id="{A58DD9CA-110A-4A6C-B3D0-ADE9A0792E12}" type="datetimeFigureOut">
               <a:rPr lang="en-US" smtClean="0"/>
-              <a:t>4/14/2015</a:t>
+              <a:t>5/7/2015</a:t>
             </a:fld>
             <a:endParaRPr lang="en-US"/>
           </a:p>
@@ -2609,7 +2610,7 @@
           <a:p>
             <a:fld id="{A58DD9CA-110A-4A6C-B3D0-ADE9A0792E12}" type="datetimeFigureOut">
               <a:rPr lang="en-US" smtClean="0"/>
-              <a:t>4/14/2015</a:t>
+              <a:t>5/7/2015</a:t>
             </a:fld>
             <a:endParaRPr lang="en-US"/>
           </a:p>
@@ -2976,7 +2977,7 @@
           <a:p>
             <a:fld id="{A58DD9CA-110A-4A6C-B3D0-ADE9A0792E12}" type="datetimeFigureOut">
               <a:rPr lang="en-US" smtClean="0"/>
-              <a:t>4/14/2015</a:t>
+              <a:t>5/7/2015</a:t>
             </a:fld>
             <a:endParaRPr lang="en-US"/>
           </a:p>
@@ -3094,7 +3095,7 @@
           <a:p>
             <a:fld id="{A58DD9CA-110A-4A6C-B3D0-ADE9A0792E12}" type="datetimeFigureOut">
               <a:rPr lang="en-US" smtClean="0"/>
-              <a:t>4/14/2015</a:t>
+              <a:t>5/7/2015</a:t>
             </a:fld>
             <a:endParaRPr lang="en-US"/>
           </a:p>
@@ -3189,7 +3190,7 @@
           <a:p>
             <a:fld id="{A58DD9CA-110A-4A6C-B3D0-ADE9A0792E12}" type="datetimeFigureOut">
               <a:rPr lang="en-US" smtClean="0"/>
-              <a:t>4/14/2015</a:t>
+              <a:t>5/7/2015</a:t>
             </a:fld>
             <a:endParaRPr lang="en-US"/>
           </a:p>
@@ -3466,7 +3467,7 @@
           <a:p>
             <a:fld id="{A58DD9CA-110A-4A6C-B3D0-ADE9A0792E12}" type="datetimeFigureOut">
               <a:rPr lang="en-US" smtClean="0"/>
-              <a:t>4/14/2015</a:t>
+              <a:t>5/7/2015</a:t>
             </a:fld>
             <a:endParaRPr lang="en-US"/>
           </a:p>
@@ -3719,7 +3720,7 @@
           <a:p>
             <a:fld id="{A58DD9CA-110A-4A6C-B3D0-ADE9A0792E12}" type="datetimeFigureOut">
               <a:rPr lang="en-US" smtClean="0"/>
-              <a:t>4/14/2015</a:t>
+              <a:t>5/7/2015</a:t>
             </a:fld>
             <a:endParaRPr lang="en-US"/>
           </a:p>
@@ -3932,7 +3933,7 @@
           <a:p>
             <a:fld id="{A58DD9CA-110A-4A6C-B3D0-ADE9A0792E12}" type="datetimeFigureOut">
               <a:rPr lang="en-US" smtClean="0"/>
-              <a:t>4/14/2015</a:t>
+              <a:t>5/7/2015</a:t>
             </a:fld>
             <a:endParaRPr lang="en-US"/>
           </a:p>
@@ -5131,13 +5132,8 @@
             </a:pPr>
             <a:r>
               <a:rPr lang="en-US" dirty="0" smtClean="0"/>
-              <a:t>Assume all events/connections are potentially </a:t>
-            </a:r>
-            <a:r>
-              <a:rPr lang="en-US" dirty="0" smtClean="0"/>
-              <a:t>bad, instead of static rule based analysis.</a:t>
-            </a:r>
-            <a:endParaRPr lang="en-US" dirty="0" smtClean="0"/>
+              <a:t>Assume all events/connections are potentially bad, instead of static rule based analysis.</a:t>
+            </a:r>
           </a:p>
           <a:p>
             <a:pPr marL="514350" indent="-514350">
@@ -5262,15 +5258,7 @@
             </a:pPr>
             <a:r>
               <a:rPr lang="en-US" dirty="0" smtClean="0"/>
-              <a:t>Do we still need to archive everything else? YES! But we only look at it when </a:t>
-            </a:r>
-            <a:r>
-              <a:rPr lang="en-US" dirty="0" smtClean="0"/>
-              <a:t>we’re pivoting off a higher level event instead </a:t>
-            </a:r>
-            <a:r>
-              <a:rPr lang="en-US" dirty="0" smtClean="0"/>
-              <a:t>of trying to use all events as a “top level” investigative source.</a:t>
+              <a:t>Do we still need to archive everything else? YES! But we only look at it when we’re pivoting off a higher level event instead of trying to use all events as a “top level” investigative source.</a:t>
             </a:r>
             <a:endParaRPr lang="en-US" dirty="0"/>
           </a:p>
@@ -9864,6 +9852,146 @@
             <a:pPr algn="ctr"/>
             <a:r>
               <a:rPr lang="en-US" dirty="0" smtClean="0"/>
+              <a:t>Now I have to Impress the Executives…</a:t>
+            </a:r>
+            <a:endParaRPr lang="en-US" dirty="0"/>
+          </a:p>
+        </p:txBody>
+      </p:sp>
+      <p:sp>
+        <p:nvSpPr>
+          <p:cNvPr id="3" name="Content Placeholder 2"/>
+          <p:cNvSpPr>
+            <a:spLocks noGrp="1"/>
+          </p:cNvSpPr>
+          <p:nvPr>
+            <p:ph idx="1"/>
+          </p:nvPr>
+        </p:nvSpPr>
+        <p:spPr/>
+        <p:txBody>
+          <a:bodyPr/>
+          <a:lstStyle/>
+          <a:p>
+            <a:r>
+              <a:rPr lang="en-US" dirty="0" smtClean="0"/>
+              <a:t>Threat intelligence is trendy, and now I have a big repo of all my IP traffic.</a:t>
+            </a:r>
+          </a:p>
+          <a:p>
+            <a:r>
+              <a:rPr lang="en-US" dirty="0" smtClean="0"/>
+              <a:t>So I made some scripts:</a:t>
+            </a:r>
+          </a:p>
+          <a:p>
+            <a:pPr marL="0" indent="0">
+              <a:buNone/>
+            </a:pPr>
+            <a:r>
+              <a:rPr lang="en-US" dirty="0"/>
+              <a:t>	</a:t>
+            </a:r>
+            <a:r>
+              <a:rPr lang="en-US" dirty="0" smtClean="0"/>
+              <a:t>-feedpull.py Grabs threat intelligence feeds nightly.</a:t>
+            </a:r>
+          </a:p>
+          <a:p>
+            <a:pPr marL="0" indent="0">
+              <a:buNone/>
+            </a:pPr>
+            <a:r>
+              <a:rPr lang="en-US" dirty="0"/>
+              <a:t>	</a:t>
+            </a:r>
+            <a:r>
+              <a:rPr lang="en-US" dirty="0" smtClean="0"/>
+              <a:t>-threattel.py Correlates threat intelligence feeds against 			the </a:t>
+            </a:r>
+            <a:r>
+              <a:rPr lang="en-US" dirty="0" err="1" smtClean="0"/>
+              <a:t>Elasticsearch</a:t>
+            </a:r>
+            <a:r>
+              <a:rPr lang="en-US" dirty="0" smtClean="0"/>
+              <a:t> database and generates emailed reports.</a:t>
+            </a:r>
+          </a:p>
+          <a:p>
+            <a:pPr marL="0" indent="0">
+              <a:buNone/>
+            </a:pPr>
+            <a:endParaRPr lang="en-US" dirty="0"/>
+          </a:p>
+          <a:p>
+            <a:pPr marL="0" indent="0">
+              <a:buNone/>
+            </a:pPr>
+            <a:r>
+              <a:rPr lang="en-US" dirty="0" smtClean="0"/>
+              <a:t>Thanks to syphon1c and </a:t>
+            </a:r>
+            <a:r>
+              <a:rPr lang="en-US" dirty="0" err="1" smtClean="0"/>
+              <a:t>Threatelligence</a:t>
+            </a:r>
+            <a:r>
+              <a:rPr lang="en-US" dirty="0" smtClean="0"/>
+              <a:t> for the inspiration!</a:t>
+            </a:r>
+            <a:endParaRPr lang="en-US" dirty="0" smtClean="0"/>
+          </a:p>
+        </p:txBody>
+      </p:sp>
+    </p:spTree>
+    <p:extLst>
+      <p:ext uri="{BB962C8B-B14F-4D97-AF65-F5344CB8AC3E}">
+        <p14:creationId xmlns:p14="http://schemas.microsoft.com/office/powerpoint/2010/main" val="1387859567"/>
+      </p:ext>
+    </p:extLst>
+  </p:cSld>
+  <p:clrMapOvr>
+    <a:masterClrMapping/>
+  </p:clrMapOvr>
+</p:sld>
+</file>
+
+<file path=ppt/slides/slide41.xml><?xml version="1.0" encoding="utf-8"?>
+<p:sld xmlns:a="http://schemas.openxmlformats.org/drawingml/2006/main" xmlns:r="http://schemas.openxmlformats.org/officeDocument/2006/relationships" xmlns:p="http://schemas.openxmlformats.org/presentationml/2006/main">
+  <p:cSld>
+    <p:spTree>
+      <p:nvGrpSpPr>
+        <p:cNvPr id="1" name=""/>
+        <p:cNvGrpSpPr/>
+        <p:nvPr/>
+      </p:nvGrpSpPr>
+      <p:grpSpPr>
+        <a:xfrm>
+          <a:off x="0" y="0"/>
+          <a:ext cx="0" cy="0"/>
+          <a:chOff x="0" y="0"/>
+          <a:chExt cx="0" cy="0"/>
+        </a:xfrm>
+      </p:grpSpPr>
+      <p:sp>
+        <p:nvSpPr>
+          <p:cNvPr id="2" name="Title 1"/>
+          <p:cNvSpPr>
+            <a:spLocks noGrp="1"/>
+          </p:cNvSpPr>
+          <p:nvPr>
+            <p:ph type="title"/>
+          </p:nvPr>
+        </p:nvSpPr>
+        <p:spPr/>
+        <p:txBody>
+          <a:bodyPr/>
+          <a:lstStyle/>
+          <a:p>
+            <a:pPr algn="ctr"/>
+            <a:r>
+              <a:rPr lang="en-US" dirty="0" smtClean="0"/>
               <a:t>Thanks for Coming!</a:t>
             </a:r>
             <a:endParaRPr lang="en-US" dirty="0"/>
@@ -9914,16 +10042,10 @@
               <a:rPr lang="en-US" dirty="0">
                 <a:hlinkClick r:id="rId2"/>
               </a:rPr>
-              <a:t>https</a:t>
-            </a:r>
-            <a:r>
-              <a:rPr lang="en-US">
-                <a:hlinkClick r:id="rId2"/>
-              </a:rPr>
-              <a:t>://</a:t>
-            </a:r>
-            <a:r>
-              <a:rPr lang="en-US" smtClean="0">
+              <a:t>https://</a:t>
+            </a:r>
+            <a:r>
+              <a:rPr lang="en-US" dirty="0" smtClean="0">
                 <a:hlinkClick r:id="rId2"/>
               </a:rPr>
               <a:t>github.com/tcstool/netflow</a:t>

</xml_diff>